<commit_message>
Added a coin mechanic where the player has to collect coins on the track to reset the car. Reseting the car costs 1 coin, and if you don't have any, you have to restart and try again. Also changed the Respawn Car button for the 360 controller to the left bumper. D-pad was causing issues.
</commit_message>
<xml_diff>
--- a/PoorlyAnimatedRacing/Assets/Sprites/PPT Sprite Work.pptx
+++ b/PoorlyAnimatedRacing/Assets/Sprites/PPT Sprite Work.pptx
@@ -6,6 +6,7 @@
   </p:sldMasterIdLst>
   <p:sldIdLst>
     <p:sldId id="256" r:id="rId2"/>
+    <p:sldId id="257" r:id="rId3"/>
   </p:sldIdLst>
   <p:sldSz cx="12192000" cy="6858000"/>
   <p:notesSz cx="6858000" cy="9144000"/>
@@ -104,6 +105,11 @@
       </a:defRPr>
     </a:lvl9pPr>
   </p:defaultTextStyle>
+  <p:extLst>
+    <p:ext uri="{EFAFB233-063F-42B5-8137-9DF3F51BA10A}">
+      <p15:sldGuideLst xmlns:p15="http://schemas.microsoft.com/office/powerpoint/2012/main"/>
+    </p:ext>
+  </p:extLst>
 </p:presentation>
 </file>
 
@@ -254,7 +260,7 @@
           <a:p>
             <a:fld id="{4C733BD6-8CDD-465F-AFC9-07AF0694067E}" type="datetimeFigureOut">
               <a:rPr lang="en-US" smtClean="0"/>
-              <a:t>2/8/2019</a:t>
+              <a:t>2/10/2019</a:t>
             </a:fld>
             <a:endParaRPr lang="en-US"/>
           </a:p>
@@ -452,7 +458,7 @@
           <a:p>
             <a:fld id="{4C733BD6-8CDD-465F-AFC9-07AF0694067E}" type="datetimeFigureOut">
               <a:rPr lang="en-US" smtClean="0"/>
-              <a:t>2/8/2019</a:t>
+              <a:t>2/10/2019</a:t>
             </a:fld>
             <a:endParaRPr lang="en-US"/>
           </a:p>
@@ -660,7 +666,7 @@
           <a:p>
             <a:fld id="{4C733BD6-8CDD-465F-AFC9-07AF0694067E}" type="datetimeFigureOut">
               <a:rPr lang="en-US" smtClean="0"/>
-              <a:t>2/8/2019</a:t>
+              <a:t>2/10/2019</a:t>
             </a:fld>
             <a:endParaRPr lang="en-US"/>
           </a:p>
@@ -858,7 +864,7 @@
           <a:p>
             <a:fld id="{4C733BD6-8CDD-465F-AFC9-07AF0694067E}" type="datetimeFigureOut">
               <a:rPr lang="en-US" smtClean="0"/>
-              <a:t>2/8/2019</a:t>
+              <a:t>2/10/2019</a:t>
             </a:fld>
             <a:endParaRPr lang="en-US"/>
           </a:p>
@@ -1133,7 +1139,7 @@
           <a:p>
             <a:fld id="{4C733BD6-8CDD-465F-AFC9-07AF0694067E}" type="datetimeFigureOut">
               <a:rPr lang="en-US" smtClean="0"/>
-              <a:t>2/8/2019</a:t>
+              <a:t>2/10/2019</a:t>
             </a:fld>
             <a:endParaRPr lang="en-US"/>
           </a:p>
@@ -1398,7 +1404,7 @@
           <a:p>
             <a:fld id="{4C733BD6-8CDD-465F-AFC9-07AF0694067E}" type="datetimeFigureOut">
               <a:rPr lang="en-US" smtClean="0"/>
-              <a:t>2/8/2019</a:t>
+              <a:t>2/10/2019</a:t>
             </a:fld>
             <a:endParaRPr lang="en-US"/>
           </a:p>
@@ -1810,7 +1816,7 @@
           <a:p>
             <a:fld id="{4C733BD6-8CDD-465F-AFC9-07AF0694067E}" type="datetimeFigureOut">
               <a:rPr lang="en-US" smtClean="0"/>
-              <a:t>2/8/2019</a:t>
+              <a:t>2/10/2019</a:t>
             </a:fld>
             <a:endParaRPr lang="en-US"/>
           </a:p>
@@ -1951,7 +1957,7 @@
           <a:p>
             <a:fld id="{4C733BD6-8CDD-465F-AFC9-07AF0694067E}" type="datetimeFigureOut">
               <a:rPr lang="en-US" smtClean="0"/>
-              <a:t>2/8/2019</a:t>
+              <a:t>2/10/2019</a:t>
             </a:fld>
             <a:endParaRPr lang="en-US"/>
           </a:p>
@@ -2064,7 +2070,7 @@
           <a:p>
             <a:fld id="{4C733BD6-8CDD-465F-AFC9-07AF0694067E}" type="datetimeFigureOut">
               <a:rPr lang="en-US" smtClean="0"/>
-              <a:t>2/8/2019</a:t>
+              <a:t>2/10/2019</a:t>
             </a:fld>
             <a:endParaRPr lang="en-US"/>
           </a:p>
@@ -2375,7 +2381,7 @@
           <a:p>
             <a:fld id="{4C733BD6-8CDD-465F-AFC9-07AF0694067E}" type="datetimeFigureOut">
               <a:rPr lang="en-US" smtClean="0"/>
-              <a:t>2/8/2019</a:t>
+              <a:t>2/10/2019</a:t>
             </a:fld>
             <a:endParaRPr lang="en-US"/>
           </a:p>
@@ -2663,7 +2669,7 @@
           <a:p>
             <a:fld id="{4C733BD6-8CDD-465F-AFC9-07AF0694067E}" type="datetimeFigureOut">
               <a:rPr lang="en-US" smtClean="0"/>
-              <a:t>2/8/2019</a:t>
+              <a:t>2/10/2019</a:t>
             </a:fld>
             <a:endParaRPr lang="en-US"/>
           </a:p>
@@ -2904,7 +2910,7 @@
           <a:p>
             <a:fld id="{4C733BD6-8CDD-465F-AFC9-07AF0694067E}" type="datetimeFigureOut">
               <a:rPr lang="en-US" smtClean="0"/>
-              <a:t>2/8/2019</a:t>
+              <a:t>2/10/2019</a:t>
             </a:fld>
             <a:endParaRPr lang="en-US"/>
           </a:p>
@@ -5839,10 +5845,483 @@
           </a:p>
         </p:txBody>
       </p:sp>
+      <p:sp>
+        <p:nvSpPr>
+          <p:cNvPr id="2" name="Oval 1">
+            <a:extLst>
+              <a:ext uri="{FF2B5EF4-FFF2-40B4-BE49-F238E27FC236}">
+                <a16:creationId xmlns:a16="http://schemas.microsoft.com/office/drawing/2014/main" id="{2ECD969D-0BC8-40FB-8583-D2E0890218B8}"/>
+              </a:ext>
+            </a:extLst>
+          </p:cNvPr>
+          <p:cNvSpPr/>
+          <p:nvPr/>
+        </p:nvSpPr>
+        <p:spPr>
+          <a:xfrm>
+            <a:off x="9725025" y="3224014"/>
+            <a:ext cx="914400" cy="914400"/>
+          </a:xfrm>
+          <a:prstGeom prst="ellipse">
+            <a:avLst/>
+          </a:prstGeom>
+          <a:solidFill>
+            <a:srgbClr val="FFFF00"/>
+          </a:solidFill>
+          <a:ln>
+            <a:solidFill>
+              <a:srgbClr val="CC9900"/>
+            </a:solidFill>
+          </a:ln>
+        </p:spPr>
+        <p:style>
+          <a:lnRef idx="2">
+            <a:schemeClr val="accent1">
+              <a:shade val="50000"/>
+            </a:schemeClr>
+          </a:lnRef>
+          <a:fillRef idx="1">
+            <a:schemeClr val="accent1"/>
+          </a:fillRef>
+          <a:effectRef idx="0">
+            <a:schemeClr val="accent1"/>
+          </a:effectRef>
+          <a:fontRef idx="minor">
+            <a:schemeClr val="lt1"/>
+          </a:fontRef>
+        </p:style>
+        <p:txBody>
+          <a:bodyPr rtlCol="0" anchor="ctr"/>
+          <a:lstStyle/>
+          <a:p>
+            <a:pPr algn="ctr"/>
+            <a:r>
+              <a:rPr lang="en-US" sz="7200" b="1" dirty="0">
+                <a:solidFill>
+                  <a:srgbClr val="CC9900"/>
+                </a:solidFill>
+                <a:latin typeface="Cambria Math" panose="02040503050406030204" pitchFamily="18" charset="0"/>
+                <a:ea typeface="Cambria Math" panose="02040503050406030204" pitchFamily="18" charset="0"/>
+              </a:rPr>
+              <a:t>B</a:t>
+            </a:r>
+          </a:p>
+        </p:txBody>
+      </p:sp>
+      <p:sp>
+        <p:nvSpPr>
+          <p:cNvPr id="5" name="Rectangle 4">
+            <a:extLst>
+              <a:ext uri="{FF2B5EF4-FFF2-40B4-BE49-F238E27FC236}">
+                <a16:creationId xmlns:a16="http://schemas.microsoft.com/office/drawing/2014/main" id="{1059A271-AAAC-4AEB-B7C4-3A2174E5AC0B}"/>
+              </a:ext>
+            </a:extLst>
+          </p:cNvPr>
+          <p:cNvSpPr/>
+          <p:nvPr/>
+        </p:nvSpPr>
+        <p:spPr>
+          <a:xfrm>
+            <a:off x="10051446" y="3293714"/>
+            <a:ext cx="48370" cy="142875"/>
+          </a:xfrm>
+          <a:prstGeom prst="rect">
+            <a:avLst/>
+          </a:prstGeom>
+          <a:solidFill>
+            <a:srgbClr val="CC9900"/>
+          </a:solidFill>
+          <a:ln>
+            <a:solidFill>
+              <a:srgbClr val="CC9900"/>
+            </a:solidFill>
+          </a:ln>
+        </p:spPr>
+        <p:style>
+          <a:lnRef idx="2">
+            <a:schemeClr val="accent1">
+              <a:shade val="50000"/>
+            </a:schemeClr>
+          </a:lnRef>
+          <a:fillRef idx="1">
+            <a:schemeClr val="accent1"/>
+          </a:fillRef>
+          <a:effectRef idx="0">
+            <a:schemeClr val="accent1"/>
+          </a:effectRef>
+          <a:fontRef idx="minor">
+            <a:schemeClr val="lt1"/>
+          </a:fontRef>
+        </p:style>
+        <p:txBody>
+          <a:bodyPr rtlCol="0" anchor="ctr"/>
+          <a:lstStyle/>
+          <a:p>
+            <a:pPr algn="ctr"/>
+            <a:endParaRPr lang="en-US"/>
+          </a:p>
+        </p:txBody>
+      </p:sp>
+      <p:sp>
+        <p:nvSpPr>
+          <p:cNvPr id="68" name="Rectangle 67">
+            <a:extLst>
+              <a:ext uri="{FF2B5EF4-FFF2-40B4-BE49-F238E27FC236}">
+                <a16:creationId xmlns:a16="http://schemas.microsoft.com/office/drawing/2014/main" id="{17684D37-C4F0-45E9-A868-1FB5A84CD63E}"/>
+              </a:ext>
+            </a:extLst>
+          </p:cNvPr>
+          <p:cNvSpPr/>
+          <p:nvPr/>
+        </p:nvSpPr>
+        <p:spPr>
+          <a:xfrm>
+            <a:off x="10169525" y="3293714"/>
+            <a:ext cx="48370" cy="142875"/>
+          </a:xfrm>
+          <a:prstGeom prst="rect">
+            <a:avLst/>
+          </a:prstGeom>
+          <a:solidFill>
+            <a:srgbClr val="CC9900"/>
+          </a:solidFill>
+          <a:ln>
+            <a:solidFill>
+              <a:srgbClr val="CC9900"/>
+            </a:solidFill>
+          </a:ln>
+        </p:spPr>
+        <p:style>
+          <a:lnRef idx="2">
+            <a:schemeClr val="accent1">
+              <a:shade val="50000"/>
+            </a:schemeClr>
+          </a:lnRef>
+          <a:fillRef idx="1">
+            <a:schemeClr val="accent1"/>
+          </a:fillRef>
+          <a:effectRef idx="0">
+            <a:schemeClr val="accent1"/>
+          </a:effectRef>
+          <a:fontRef idx="minor">
+            <a:schemeClr val="lt1"/>
+          </a:fontRef>
+        </p:style>
+        <p:txBody>
+          <a:bodyPr rtlCol="0" anchor="ctr"/>
+          <a:lstStyle/>
+          <a:p>
+            <a:pPr algn="ctr"/>
+            <a:endParaRPr lang="en-US"/>
+          </a:p>
+        </p:txBody>
+      </p:sp>
+      <p:sp>
+        <p:nvSpPr>
+          <p:cNvPr id="69" name="Rectangle 68">
+            <a:extLst>
+              <a:ext uri="{FF2B5EF4-FFF2-40B4-BE49-F238E27FC236}">
+                <a16:creationId xmlns:a16="http://schemas.microsoft.com/office/drawing/2014/main" id="{874F5D91-745E-49DA-AF7A-BB542CCD9506}"/>
+              </a:ext>
+            </a:extLst>
+          </p:cNvPr>
+          <p:cNvSpPr/>
+          <p:nvPr/>
+        </p:nvSpPr>
+        <p:spPr>
+          <a:xfrm>
+            <a:off x="10051446" y="4005702"/>
+            <a:ext cx="48370" cy="91440"/>
+          </a:xfrm>
+          <a:prstGeom prst="rect">
+            <a:avLst/>
+          </a:prstGeom>
+          <a:solidFill>
+            <a:srgbClr val="CC9900"/>
+          </a:solidFill>
+          <a:ln>
+            <a:solidFill>
+              <a:srgbClr val="CC9900"/>
+            </a:solidFill>
+          </a:ln>
+        </p:spPr>
+        <p:style>
+          <a:lnRef idx="2">
+            <a:schemeClr val="accent1">
+              <a:shade val="50000"/>
+            </a:schemeClr>
+          </a:lnRef>
+          <a:fillRef idx="1">
+            <a:schemeClr val="accent1"/>
+          </a:fillRef>
+          <a:effectRef idx="0">
+            <a:schemeClr val="accent1"/>
+          </a:effectRef>
+          <a:fontRef idx="minor">
+            <a:schemeClr val="lt1"/>
+          </a:fontRef>
+        </p:style>
+        <p:txBody>
+          <a:bodyPr rtlCol="0" anchor="ctr"/>
+          <a:lstStyle/>
+          <a:p>
+            <a:pPr algn="ctr"/>
+            <a:endParaRPr lang="en-US"/>
+          </a:p>
+        </p:txBody>
+      </p:sp>
+      <p:sp>
+        <p:nvSpPr>
+          <p:cNvPr id="70" name="Rectangle 69">
+            <a:extLst>
+              <a:ext uri="{FF2B5EF4-FFF2-40B4-BE49-F238E27FC236}">
+                <a16:creationId xmlns:a16="http://schemas.microsoft.com/office/drawing/2014/main" id="{356ADE44-656B-451D-BD91-8FE0E25A23FC}"/>
+              </a:ext>
+            </a:extLst>
+          </p:cNvPr>
+          <p:cNvSpPr/>
+          <p:nvPr/>
+        </p:nvSpPr>
+        <p:spPr>
+          <a:xfrm>
+            <a:off x="10169525" y="4005702"/>
+            <a:ext cx="48370" cy="91440"/>
+          </a:xfrm>
+          <a:prstGeom prst="rect">
+            <a:avLst/>
+          </a:prstGeom>
+          <a:solidFill>
+            <a:srgbClr val="CC9900"/>
+          </a:solidFill>
+          <a:ln>
+            <a:solidFill>
+              <a:srgbClr val="CC9900"/>
+            </a:solidFill>
+          </a:ln>
+        </p:spPr>
+        <p:style>
+          <a:lnRef idx="2">
+            <a:schemeClr val="accent1">
+              <a:shade val="50000"/>
+            </a:schemeClr>
+          </a:lnRef>
+          <a:fillRef idx="1">
+            <a:schemeClr val="accent1"/>
+          </a:fillRef>
+          <a:effectRef idx="0">
+            <a:schemeClr val="accent1"/>
+          </a:effectRef>
+          <a:fontRef idx="minor">
+            <a:schemeClr val="lt1"/>
+          </a:fontRef>
+        </p:style>
+        <p:txBody>
+          <a:bodyPr rtlCol="0" anchor="ctr"/>
+          <a:lstStyle/>
+          <a:p>
+            <a:pPr algn="ctr"/>
+            <a:endParaRPr lang="en-US"/>
+          </a:p>
+        </p:txBody>
+      </p:sp>
+      <p:pic>
+        <p:nvPicPr>
+          <p:cNvPr id="6" name="Picture 5">
+            <a:extLst>
+              <a:ext uri="{FF2B5EF4-FFF2-40B4-BE49-F238E27FC236}">
+                <a16:creationId xmlns:a16="http://schemas.microsoft.com/office/drawing/2014/main" id="{5253F00A-CFE3-4DED-BE0F-8911AC848471}"/>
+              </a:ext>
+            </a:extLst>
+          </p:cNvPr>
+          <p:cNvPicPr>
+            <a:picLocks noChangeAspect="1"/>
+          </p:cNvPicPr>
+          <p:nvPr/>
+        </p:nvPicPr>
+        <p:blipFill rotWithShape="1">
+          <a:blip r:embed="rId2">
+            <a:extLst>
+              <a:ext uri="{28A0092B-C50C-407E-A947-70E740481C1C}">
+                <a14:useLocalDpi xmlns:a14="http://schemas.microsoft.com/office/drawing/2010/main" val="0"/>
+              </a:ext>
+            </a:extLst>
+          </a:blip>
+          <a:srcRect l="22256" t="19078" r="21389" b="32593"/>
+          <a:stretch/>
+        </p:blipFill>
+        <p:spPr>
+          <a:xfrm>
+            <a:off x="7762875" y="5722144"/>
+            <a:ext cx="931063" cy="931069"/>
+          </a:xfrm>
+          <a:prstGeom prst="rect">
+            <a:avLst/>
+          </a:prstGeom>
+        </p:spPr>
+      </p:pic>
     </p:spTree>
     <p:extLst>
       <p:ext uri="{BB962C8B-B14F-4D97-AF65-F5344CB8AC3E}">
         <p14:creationId xmlns:p14="http://schemas.microsoft.com/office/powerpoint/2010/main" val="2247107852"/>
+      </p:ext>
+    </p:extLst>
+  </p:cSld>
+  <p:clrMapOvr>
+    <a:masterClrMapping/>
+  </p:clrMapOvr>
+</p:sld>
+</file>
+
+<file path=ppt/slides/slide2.xml><?xml version="1.0" encoding="utf-8"?>
+<p:sld xmlns:a="http://schemas.openxmlformats.org/drawingml/2006/main" xmlns:r="http://schemas.openxmlformats.org/officeDocument/2006/relationships" xmlns:p="http://schemas.openxmlformats.org/presentationml/2006/main">
+  <p:cSld>
+    <p:spTree>
+      <p:nvGrpSpPr>
+        <p:cNvPr id="1" name=""/>
+        <p:cNvGrpSpPr/>
+        <p:nvPr/>
+      </p:nvGrpSpPr>
+      <p:grpSpPr>
+        <a:xfrm>
+          <a:off x="0" y="0"/>
+          <a:ext cx="0" cy="0"/>
+          <a:chOff x="0" y="0"/>
+          <a:chExt cx="0" cy="0"/>
+        </a:xfrm>
+      </p:grpSpPr>
+      <p:sp>
+        <p:nvSpPr>
+          <p:cNvPr id="4" name="Rectangle 3">
+            <a:extLst>
+              <a:ext uri="{FF2B5EF4-FFF2-40B4-BE49-F238E27FC236}">
+                <a16:creationId xmlns:a16="http://schemas.microsoft.com/office/drawing/2014/main" id="{0C2F2227-6DB5-4622-ADE2-6A602C256033}"/>
+              </a:ext>
+            </a:extLst>
+          </p:cNvPr>
+          <p:cNvSpPr/>
+          <p:nvPr/>
+        </p:nvSpPr>
+        <p:spPr>
+          <a:xfrm>
+            <a:off x="0" y="0"/>
+            <a:ext cx="4932761" cy="923330"/>
+          </a:xfrm>
+          <a:prstGeom prst="rect">
+            <a:avLst/>
+          </a:prstGeom>
+          <a:noFill/>
+        </p:spPr>
+        <p:txBody>
+          <a:bodyPr wrap="none" lIns="91440" tIns="45720" rIns="91440" bIns="45720">
+            <a:spAutoFit/>
+          </a:bodyPr>
+          <a:lstStyle/>
+          <a:p>
+            <a:pPr algn="ctr"/>
+            <a:r>
+              <a:rPr lang="en-US" sz="5400" b="1" dirty="0">
+                <a:ln w="12700">
+                  <a:solidFill>
+                    <a:srgbClr val="CC9900"/>
+                  </a:solidFill>
+                  <a:prstDash val="solid"/>
+                </a:ln>
+                <a:solidFill>
+                  <a:srgbClr val="FFFF00"/>
+                </a:solidFill>
+                <a:effectLst>
+                  <a:innerShdw blurRad="177800">
+                    <a:schemeClr val="accent3">
+                      <a:lumMod val="50000"/>
+                    </a:schemeClr>
+                  </a:innerShdw>
+                </a:effectLst>
+              </a:rPr>
+              <a:t>Out of Money </a:t>
+            </a:r>
+            <a:r>
+              <a:rPr lang="en-US" sz="5400" b="1" dirty="0">
+                <a:ln w="12700">
+                  <a:solidFill>
+                    <a:srgbClr val="CC9900"/>
+                  </a:solidFill>
+                  <a:prstDash val="solid"/>
+                </a:ln>
+                <a:solidFill>
+                  <a:srgbClr val="FFFF00"/>
+                </a:solidFill>
+                <a:effectLst>
+                  <a:innerShdw blurRad="177800">
+                    <a:schemeClr val="accent3">
+                      <a:lumMod val="50000"/>
+                    </a:schemeClr>
+                  </a:innerShdw>
+                </a:effectLst>
+                <a:sym typeface="Wingdings" panose="05000000000000000000" pitchFamily="2" charset="2"/>
+              </a:rPr>
+              <a:t></a:t>
+            </a:r>
+          </a:p>
+        </p:txBody>
+      </p:sp>
+      <p:sp>
+        <p:nvSpPr>
+          <p:cNvPr id="3" name="Rectangle 2">
+            <a:extLst>
+              <a:ext uri="{FF2B5EF4-FFF2-40B4-BE49-F238E27FC236}">
+                <a16:creationId xmlns:a16="http://schemas.microsoft.com/office/drawing/2014/main" id="{D510FCE7-47CE-43B0-A303-7E9C64CFF9E9}"/>
+              </a:ext>
+            </a:extLst>
+          </p:cNvPr>
+          <p:cNvSpPr/>
+          <p:nvPr/>
+        </p:nvSpPr>
+        <p:spPr>
+          <a:xfrm>
+            <a:off x="5611955" y="2967335"/>
+            <a:ext cx="1816524" cy="923330"/>
+          </a:xfrm>
+          <a:prstGeom prst="rect">
+            <a:avLst/>
+          </a:prstGeom>
+          <a:noFill/>
+        </p:spPr>
+        <p:txBody>
+          <a:bodyPr wrap="square" lIns="91440" tIns="45720" rIns="91440" bIns="45720">
+            <a:spAutoFit/>
+          </a:bodyPr>
+          <a:lstStyle/>
+          <a:p>
+            <a:pPr algn="ctr"/>
+            <a:r>
+              <a:rPr lang="en-US" sz="5400" b="1" dirty="0">
+                <a:ln w="12700">
+                  <a:solidFill>
+                    <a:srgbClr val="CC9900"/>
+                  </a:solidFill>
+                  <a:prstDash val="solid"/>
+                </a:ln>
+                <a:solidFill>
+                  <a:srgbClr val="FFFF00"/>
+                </a:solidFill>
+                <a:effectLst>
+                  <a:innerShdw blurRad="177800">
+                    <a:schemeClr val="accent3">
+                      <a:lumMod val="50000"/>
+                    </a:schemeClr>
+                  </a:innerShdw>
+                </a:effectLst>
+                <a:sym typeface="Wingdings" panose="05000000000000000000" pitchFamily="2" charset="2"/>
+              </a:rPr>
+              <a:t>NOPE</a:t>
+            </a:r>
+          </a:p>
+        </p:txBody>
+      </p:sp>
+    </p:spTree>
+    <p:extLst>
+      <p:ext uri="{BB962C8B-B14F-4D97-AF65-F5344CB8AC3E}">
+        <p14:creationId xmlns:p14="http://schemas.microsoft.com/office/powerpoint/2010/main" val="4091942664"/>
       </p:ext>
     </p:extLst>
   </p:cSld>

</xml_diff>

<commit_message>
Changed the way the hierarchy for track segments work. This allows the game to pass data between scripts without having to got through a very rigid parent-child structure. This means we can be much more flexible in how track segments are designed...and of course, no mor 'getchild(0).getchild(0).getchild(0)' anywhere in the code!
</commit_message>
<xml_diff>
--- a/PoorlyAnimatedRacing/Assets/Sprites/PPT Sprite Work.pptx
+++ b/PoorlyAnimatedRacing/Assets/Sprites/PPT Sprite Work.pptx
@@ -260,7 +260,7 @@
           <a:p>
             <a:fld id="{4C733BD6-8CDD-465F-AFC9-07AF0694067E}" type="datetimeFigureOut">
               <a:rPr lang="en-US" smtClean="0"/>
-              <a:t>2/10/2019</a:t>
+              <a:t>2/15/2019</a:t>
             </a:fld>
             <a:endParaRPr lang="en-US"/>
           </a:p>
@@ -458,7 +458,7 @@
           <a:p>
             <a:fld id="{4C733BD6-8CDD-465F-AFC9-07AF0694067E}" type="datetimeFigureOut">
               <a:rPr lang="en-US" smtClean="0"/>
-              <a:t>2/10/2019</a:t>
+              <a:t>2/15/2019</a:t>
             </a:fld>
             <a:endParaRPr lang="en-US"/>
           </a:p>
@@ -666,7 +666,7 @@
           <a:p>
             <a:fld id="{4C733BD6-8CDD-465F-AFC9-07AF0694067E}" type="datetimeFigureOut">
               <a:rPr lang="en-US" smtClean="0"/>
-              <a:t>2/10/2019</a:t>
+              <a:t>2/15/2019</a:t>
             </a:fld>
             <a:endParaRPr lang="en-US"/>
           </a:p>
@@ -864,7 +864,7 @@
           <a:p>
             <a:fld id="{4C733BD6-8CDD-465F-AFC9-07AF0694067E}" type="datetimeFigureOut">
               <a:rPr lang="en-US" smtClean="0"/>
-              <a:t>2/10/2019</a:t>
+              <a:t>2/15/2019</a:t>
             </a:fld>
             <a:endParaRPr lang="en-US"/>
           </a:p>
@@ -1139,7 +1139,7 @@
           <a:p>
             <a:fld id="{4C733BD6-8CDD-465F-AFC9-07AF0694067E}" type="datetimeFigureOut">
               <a:rPr lang="en-US" smtClean="0"/>
-              <a:t>2/10/2019</a:t>
+              <a:t>2/15/2019</a:t>
             </a:fld>
             <a:endParaRPr lang="en-US"/>
           </a:p>
@@ -1404,7 +1404,7 @@
           <a:p>
             <a:fld id="{4C733BD6-8CDD-465F-AFC9-07AF0694067E}" type="datetimeFigureOut">
               <a:rPr lang="en-US" smtClean="0"/>
-              <a:t>2/10/2019</a:t>
+              <a:t>2/15/2019</a:t>
             </a:fld>
             <a:endParaRPr lang="en-US"/>
           </a:p>
@@ -1816,7 +1816,7 @@
           <a:p>
             <a:fld id="{4C733BD6-8CDD-465F-AFC9-07AF0694067E}" type="datetimeFigureOut">
               <a:rPr lang="en-US" smtClean="0"/>
-              <a:t>2/10/2019</a:t>
+              <a:t>2/15/2019</a:t>
             </a:fld>
             <a:endParaRPr lang="en-US"/>
           </a:p>
@@ -1957,7 +1957,7 @@
           <a:p>
             <a:fld id="{4C733BD6-8CDD-465F-AFC9-07AF0694067E}" type="datetimeFigureOut">
               <a:rPr lang="en-US" smtClean="0"/>
-              <a:t>2/10/2019</a:t>
+              <a:t>2/15/2019</a:t>
             </a:fld>
             <a:endParaRPr lang="en-US"/>
           </a:p>
@@ -2070,7 +2070,7 @@
           <a:p>
             <a:fld id="{4C733BD6-8CDD-465F-AFC9-07AF0694067E}" type="datetimeFigureOut">
               <a:rPr lang="en-US" smtClean="0"/>
-              <a:t>2/10/2019</a:t>
+              <a:t>2/15/2019</a:t>
             </a:fld>
             <a:endParaRPr lang="en-US"/>
           </a:p>
@@ -2381,7 +2381,7 @@
           <a:p>
             <a:fld id="{4C733BD6-8CDD-465F-AFC9-07AF0694067E}" type="datetimeFigureOut">
               <a:rPr lang="en-US" smtClean="0"/>
-              <a:t>2/10/2019</a:t>
+              <a:t>2/15/2019</a:t>
             </a:fld>
             <a:endParaRPr lang="en-US"/>
           </a:p>
@@ -2669,7 +2669,7 @@
           <a:p>
             <a:fld id="{4C733BD6-8CDD-465F-AFC9-07AF0694067E}" type="datetimeFigureOut">
               <a:rPr lang="en-US" smtClean="0"/>
-              <a:t>2/10/2019</a:t>
+              <a:t>2/15/2019</a:t>
             </a:fld>
             <a:endParaRPr lang="en-US"/>
           </a:p>
@@ -2910,7 +2910,7 @@
           <a:p>
             <a:fld id="{4C733BD6-8CDD-465F-AFC9-07AF0694067E}" type="datetimeFigureOut">
               <a:rPr lang="en-US" smtClean="0"/>
-              <a:t>2/10/2019</a:t>
+              <a:t>2/15/2019</a:t>
             </a:fld>
             <a:endParaRPr lang="en-US"/>
           </a:p>
@@ -5418,9 +5418,9 @@
             <a:avLst/>
           </a:prstGeom>
           <a:noFill/>
-          <a:ln w="38100">
+          <a:ln w="57150">
             <a:solidFill>
-              <a:srgbClr val="00FF00"/>
+              <a:srgbClr val="FF0000"/>
             </a:solidFill>
           </a:ln>
         </p:spPr>
@@ -5470,9 +5470,9 @@
             <a:avLst/>
           </a:prstGeom>
           <a:noFill/>
-          <a:ln w="38100">
+          <a:ln w="57150">
             <a:solidFill>
-              <a:srgbClr val="00FF00"/>
+              <a:srgbClr val="FF0000"/>
             </a:solidFill>
           </a:ln>
         </p:spPr>

</xml_diff>

<commit_message>
Alternative Track Build. Added a new functionality that allows us to create track segments that split into multiple routes. The hidden route potential is exciting, and an example splitter track segment has been added to demonstrate this functionality. Also added a Rise track piece...similar to the drop, just in the opposite direction.
</commit_message>
<xml_diff>
--- a/PoorlyAnimatedRacing/Assets/Sprites/PPT Sprite Work.pptx
+++ b/PoorlyAnimatedRacing/Assets/Sprites/PPT Sprite Work.pptx
@@ -260,7 +260,7 @@
           <a:p>
             <a:fld id="{4C733BD6-8CDD-465F-AFC9-07AF0694067E}" type="datetimeFigureOut">
               <a:rPr lang="en-US" smtClean="0"/>
-              <a:t>2/15/2019</a:t>
+              <a:t>2/24/2019</a:t>
             </a:fld>
             <a:endParaRPr lang="en-US"/>
           </a:p>
@@ -458,7 +458,7 @@
           <a:p>
             <a:fld id="{4C733BD6-8CDD-465F-AFC9-07AF0694067E}" type="datetimeFigureOut">
               <a:rPr lang="en-US" smtClean="0"/>
-              <a:t>2/15/2019</a:t>
+              <a:t>2/24/2019</a:t>
             </a:fld>
             <a:endParaRPr lang="en-US"/>
           </a:p>
@@ -666,7 +666,7 @@
           <a:p>
             <a:fld id="{4C733BD6-8CDD-465F-AFC9-07AF0694067E}" type="datetimeFigureOut">
               <a:rPr lang="en-US" smtClean="0"/>
-              <a:t>2/15/2019</a:t>
+              <a:t>2/24/2019</a:t>
             </a:fld>
             <a:endParaRPr lang="en-US"/>
           </a:p>
@@ -864,7 +864,7 @@
           <a:p>
             <a:fld id="{4C733BD6-8CDD-465F-AFC9-07AF0694067E}" type="datetimeFigureOut">
               <a:rPr lang="en-US" smtClean="0"/>
-              <a:t>2/15/2019</a:t>
+              <a:t>2/24/2019</a:t>
             </a:fld>
             <a:endParaRPr lang="en-US"/>
           </a:p>
@@ -1139,7 +1139,7 @@
           <a:p>
             <a:fld id="{4C733BD6-8CDD-465F-AFC9-07AF0694067E}" type="datetimeFigureOut">
               <a:rPr lang="en-US" smtClean="0"/>
-              <a:t>2/15/2019</a:t>
+              <a:t>2/24/2019</a:t>
             </a:fld>
             <a:endParaRPr lang="en-US"/>
           </a:p>
@@ -1404,7 +1404,7 @@
           <a:p>
             <a:fld id="{4C733BD6-8CDD-465F-AFC9-07AF0694067E}" type="datetimeFigureOut">
               <a:rPr lang="en-US" smtClean="0"/>
-              <a:t>2/15/2019</a:t>
+              <a:t>2/24/2019</a:t>
             </a:fld>
             <a:endParaRPr lang="en-US"/>
           </a:p>
@@ -1816,7 +1816,7 @@
           <a:p>
             <a:fld id="{4C733BD6-8CDD-465F-AFC9-07AF0694067E}" type="datetimeFigureOut">
               <a:rPr lang="en-US" smtClean="0"/>
-              <a:t>2/15/2019</a:t>
+              <a:t>2/24/2019</a:t>
             </a:fld>
             <a:endParaRPr lang="en-US"/>
           </a:p>
@@ -1957,7 +1957,7 @@
           <a:p>
             <a:fld id="{4C733BD6-8CDD-465F-AFC9-07AF0694067E}" type="datetimeFigureOut">
               <a:rPr lang="en-US" smtClean="0"/>
-              <a:t>2/15/2019</a:t>
+              <a:t>2/24/2019</a:t>
             </a:fld>
             <a:endParaRPr lang="en-US"/>
           </a:p>
@@ -2070,7 +2070,7 @@
           <a:p>
             <a:fld id="{4C733BD6-8CDD-465F-AFC9-07AF0694067E}" type="datetimeFigureOut">
               <a:rPr lang="en-US" smtClean="0"/>
-              <a:t>2/15/2019</a:t>
+              <a:t>2/24/2019</a:t>
             </a:fld>
             <a:endParaRPr lang="en-US"/>
           </a:p>
@@ -2381,7 +2381,7 @@
           <a:p>
             <a:fld id="{4C733BD6-8CDD-465F-AFC9-07AF0694067E}" type="datetimeFigureOut">
               <a:rPr lang="en-US" smtClean="0"/>
-              <a:t>2/15/2019</a:t>
+              <a:t>2/24/2019</a:t>
             </a:fld>
             <a:endParaRPr lang="en-US"/>
           </a:p>
@@ -2669,7 +2669,7 @@
           <a:p>
             <a:fld id="{4C733BD6-8CDD-465F-AFC9-07AF0694067E}" type="datetimeFigureOut">
               <a:rPr lang="en-US" smtClean="0"/>
-              <a:t>2/15/2019</a:t>
+              <a:t>2/24/2019</a:t>
             </a:fld>
             <a:endParaRPr lang="en-US"/>
           </a:p>
@@ -2910,7 +2910,7 @@
           <a:p>
             <a:fld id="{4C733BD6-8CDD-465F-AFC9-07AF0694067E}" type="datetimeFigureOut">
               <a:rPr lang="en-US" smtClean="0"/>
-              <a:t>2/15/2019</a:t>
+              <a:t>2/24/2019</a:t>
             </a:fld>
             <a:endParaRPr lang="en-US"/>
           </a:p>
@@ -5736,6 +5736,9 @@
           <a:prstGeom prst="flowChartExtract">
             <a:avLst/>
           </a:prstGeom>
+          <a:solidFill>
+            <a:srgbClr val="FFC000"/>
+          </a:solidFill>
           <a:ln w="44450" cmpd="thickThin">
             <a:solidFill>
               <a:schemeClr val="bg1"/>
@@ -5765,11 +5768,17 @@
             <a:pPr algn="ctr"/>
             <a:r>
               <a:rPr lang="en-US" sz="6600" b="1" dirty="0">
+                <a:solidFill>
+                  <a:schemeClr val="tx1">
+                    <a:lumMod val="75000"/>
+                    <a:lumOff val="25000"/>
+                  </a:schemeClr>
+                </a:solidFill>
                 <a:latin typeface="Ebrima" panose="02000000000000000000" pitchFamily="2" charset="0"/>
                 <a:ea typeface="Ebrima" panose="02000000000000000000" pitchFamily="2" charset="0"/>
                 <a:cs typeface="Ebrima" panose="02000000000000000000" pitchFamily="2" charset="0"/>
               </a:rPr>
-              <a:t>J</a:t>
+              <a:t>R</a:t>
             </a:r>
           </a:p>
         </p:txBody>

</xml_diff>